<commit_message>
talk-slides: Update default shape.
</commit_message>
<xml_diff>
--- a/talk-slides/16x9-template.pptx
+++ b/talk-slides/16x9-template.pptx
@@ -199,7 +199,7 @@
           <a:p>
             <a:fld id="{33639637-A6E8-452D-98B2-51C8A29CC287}" type="datetime1">
               <a:rPr lang="en-US" smtClean="0"/>
-              <a:t>4/18/2023</a:t>
+              <a:t>4/19/2023</a:t>
             </a:fld>
             <a:endParaRPr lang="en-US"/>
           </a:p>
@@ -576,7 +576,7 @@
           <a:p>
             <a:fld id="{F830ACF9-5D1D-4DBF-ABEA-93C42033C8AC}" type="datetime1">
               <a:rPr lang="en-US" smtClean="0"/>
-              <a:t>4/18/2023</a:t>
+              <a:t>4/19/2023</a:t>
             </a:fld>
             <a:endParaRPr lang="en-US"/>
           </a:p>
@@ -689,7 +689,7 @@
           <a:p>
             <a:fld id="{345D3C59-926E-44D2-B63C-57B70178FAAA}" type="datetime1">
               <a:rPr lang="en-US" smtClean="0"/>
-              <a:t>4/18/2023</a:t>
+              <a:t>4/19/2023</a:t>
             </a:fld>
             <a:endParaRPr lang="en-US"/>
           </a:p>
@@ -1085,7 +1085,7 @@
           <a:p>
             <a:fld id="{2DFC615C-B564-43D1-81E8-3A51D4599FB9}" type="datetime1">
               <a:rPr lang="en-US" smtClean="0"/>
-              <a:t>4/18/2023</a:t>
+              <a:t>4/19/2023</a:t>
             </a:fld>
             <a:endParaRPr lang="en-US"/>
           </a:p>
@@ -1360,7 +1360,7 @@
           <a:p>
             <a:fld id="{C8CB1670-9DD0-459B-977E-B405486FFF41}" type="datetime1">
               <a:rPr lang="en-US" smtClean="0"/>
-              <a:t>4/18/2023</a:t>
+              <a:t>4/19/2023</a:t>
             </a:fld>
             <a:endParaRPr lang="en-US"/>
           </a:p>
@@ -1689,7 +1689,7 @@
           <a:p>
             <a:fld id="{D83046E4-BD1F-46AE-B11D-82FA519AC7FB}" type="datetime1">
               <a:rPr lang="en-US" smtClean="0"/>
-              <a:t>4/18/2023</a:t>
+              <a:t>4/19/2023</a:t>
             </a:fld>
             <a:endParaRPr lang="en-US"/>
           </a:p>
@@ -2117,7 +2117,7 @@
           <a:p>
             <a:fld id="{F830ACF9-5D1D-4DBF-ABEA-93C42033C8AC}" type="datetime1">
               <a:rPr lang="en-US" smtClean="0"/>
-              <a:t>4/18/2023</a:t>
+              <a:t>4/19/2023</a:t>
             </a:fld>
             <a:endParaRPr lang="en-US"/>
           </a:p>
@@ -2500,7 +2500,7 @@
           <a:p>
             <a:fld id="{345D3C59-926E-44D2-B63C-57B70178FAAA}" type="datetime1">
               <a:rPr lang="en-US" smtClean="0"/>
-              <a:t>4/18/2023</a:t>
+              <a:t>4/19/2023</a:t>
             </a:fld>
             <a:endParaRPr lang="en-US"/>
           </a:p>
@@ -2892,7 +2892,7 @@
           <a:p>
             <a:fld id="{2DFC615C-B564-43D1-81E8-3A51D4599FB9}" type="datetime1">
               <a:rPr lang="en-US" smtClean="0"/>
-              <a:t>4/18/2023</a:t>
+              <a:t>4/19/2023</a:t>
             </a:fld>
             <a:endParaRPr lang="en-US"/>
           </a:p>
@@ -3274,7 +3274,7 @@
           <a:p>
             <a:fld id="{33639637-A6E8-452D-98B2-51C8A29CC287}" type="datetime1">
               <a:rPr lang="en-US" smtClean="0"/>
-              <a:t>4/18/2023</a:t>
+              <a:t>4/19/2023</a:t>
             </a:fld>
             <a:endParaRPr lang="en-US"/>
           </a:p>
@@ -3559,7 +3559,7 @@
           <a:p>
             <a:fld id="{C8CB1670-9DD0-459B-977E-B405486FFF41}" type="datetime1">
               <a:rPr lang="en-US" smtClean="0"/>
-              <a:t>4/18/2023</a:t>
+              <a:t>4/19/2023</a:t>
             </a:fld>
             <a:endParaRPr lang="en-US"/>
           </a:p>
@@ -3672,7 +3672,7 @@
           <a:p>
             <a:fld id="{D83046E4-BD1F-46AE-B11D-82FA519AC7FB}" type="datetime1">
               <a:rPr lang="en-US" smtClean="0"/>
-              <a:t>4/18/2023</a:t>
+              <a:t>4/19/2023</a:t>
             </a:fld>
             <a:endParaRPr lang="en-US"/>
           </a:p>
@@ -4197,7 +4197,7 @@
           <a:p>
             <a:fld id="{75FE7A0E-B73F-47A5-93F2-3016E1DE3045}" type="datetime1">
               <a:rPr lang="en-US" smtClean="0"/>
-              <a:t>4/18/2023</a:t>
+              <a:t>4/19/2023</a:t>
             </a:fld>
             <a:endParaRPr lang="en-US"/>
           </a:p>
@@ -4760,7 +4760,7 @@
           <a:p>
             <a:fld id="{75FE7A0E-B73F-47A5-93F2-3016E1DE3045}" type="datetime1">
               <a:rPr lang="en-US" smtClean="0"/>
-              <a:t>4/18/2023</a:t>
+              <a:t>4/19/2023</a:t>
             </a:fld>
             <a:endParaRPr lang="en-US"/>
           </a:p>
@@ -5372,7 +5372,73 @@
       </a:bgFillStyleLst>
     </a:fmtScheme>
   </a:themeElements>
-  <a:objectDefaults/>
+  <a:objectDefaults>
+    <a:spDef>
+      <a:spPr>
+        <a:solidFill>
+          <a:schemeClr val="bg2"/>
+        </a:solidFill>
+        <a:ln>
+          <a:noFill/>
+        </a:ln>
+      </a:spPr>
+      <a:bodyPr rtlCol="0" anchor="ctr"/>
+      <a:lstStyle>
+        <a:defPPr algn="ctr">
+          <a:defRPr sz="2400" dirty="0" smtClean="0">
+            <a:solidFill>
+              <a:schemeClr val="tx1"/>
+            </a:solidFill>
+          </a:defRPr>
+        </a:defPPr>
+      </a:lstStyle>
+      <a:style>
+        <a:lnRef idx="2">
+          <a:schemeClr val="accent1">
+            <a:shade val="50000"/>
+          </a:schemeClr>
+        </a:lnRef>
+        <a:fillRef idx="1">
+          <a:schemeClr val="accent1"/>
+        </a:fillRef>
+        <a:effectRef idx="0">
+          <a:schemeClr val="accent1"/>
+        </a:effectRef>
+        <a:fontRef idx="minor">
+          <a:schemeClr val="lt1"/>
+        </a:fontRef>
+      </a:style>
+    </a:spDef>
+    <a:lnDef>
+      <a:spPr>
+        <a:ln w="38100">
+          <a:solidFill>
+            <a:schemeClr val="tx1">
+              <a:lumMod val="50000"/>
+              <a:lumOff val="50000"/>
+            </a:schemeClr>
+          </a:solidFill>
+          <a:tailEnd type="triangle" w="lg" len="lg"/>
+        </a:ln>
+      </a:spPr>
+      <a:bodyPr/>
+      <a:lstStyle/>
+      <a:style>
+        <a:lnRef idx="1">
+          <a:schemeClr val="accent1"/>
+        </a:lnRef>
+        <a:fillRef idx="0">
+          <a:schemeClr val="accent1"/>
+        </a:fillRef>
+        <a:effectRef idx="0">
+          <a:schemeClr val="accent1"/>
+        </a:effectRef>
+        <a:fontRef idx="minor">
+          <a:schemeClr val="tx1"/>
+        </a:fontRef>
+      </a:style>
+    </a:lnDef>
+  </a:objectDefaults>
   <a:extraClrSchemeLst/>
   <a:extLst>
     <a:ext uri="{05A4C25C-085E-4340-85A3-A5531E510DB2}">

</xml_diff>